<commit_message>
Initial draft of deck
</commit_message>
<xml_diff>
--- a/O3654-5 Deep dive into native Universal Windows App Development with Office 365 APIs/Deep Dive into native Universal App development with Office 365 APIs.pptx
+++ b/O3654-5 Deep dive into native Universal Windows App Development with Office 365 APIs/Deep Dive into native Universal App development with Office 365 APIs.pptx
@@ -6,10 +6,10 @@
     <p:sldMasterId id="2147484046" r:id="rId5"/>
   </p:sldMasterIdLst>
   <p:notesMasterIdLst>
-    <p:notesMasterId r:id="rId18"/>
+    <p:notesMasterId r:id="rId20"/>
   </p:notesMasterIdLst>
   <p:handoutMasterIdLst>
-    <p:handoutMasterId r:id="rId19"/>
+    <p:handoutMasterId r:id="rId21"/>
   </p:handoutMasterIdLst>
   <p:sldIdLst>
     <p:sldId id="657" r:id="rId6"/>
@@ -23,7 +23,9 @@
     <p:sldId id="668" r:id="rId14"/>
     <p:sldId id="666" r:id="rId15"/>
     <p:sldId id="661" r:id="rId16"/>
-    <p:sldId id="654" r:id="rId17"/>
+    <p:sldId id="669" r:id="rId17"/>
+    <p:sldId id="670" r:id="rId18"/>
+    <p:sldId id="654" r:id="rId19"/>
   </p:sldIdLst>
   <p:sldSz cx="12188825" cy="6858000"/>
   <p:notesSz cx="6858000" cy="9144000"/>
@@ -326,7 +328,7 @@
           <a:p>
             <a:fld id="{DE219B1A-AE41-483B-A766-69B9363DDA6A}" type="datetimeFigureOut">
               <a:rPr lang="en-US" smtClean="0"/>
-              <a:t>9/29/2014</a:t>
+              <a:t>9/30/2014</a:t>
             </a:fld>
             <a:endParaRPr lang="en-US"/>
           </a:p>
@@ -608,7 +610,7 @@
           <a:p>
             <a:fld id="{D51B1278-D92B-4AF3-A9C1-71DD298190CE}" type="datetimeFigureOut">
               <a:rPr lang="en-US" smtClean="0"/>
-              <a:t>9/29/2014</a:t>
+              <a:t>9/30/2014</a:t>
             </a:fld>
             <a:endParaRPr lang="en-US"/>
           </a:p>
@@ -1101,7 +1103,7 @@
                 </a:solidFill>
               </a:rPr>
               <a:pPr/>
-              <a:t>9/29/2014</a:t>
+              <a:t>9/30/2014</a:t>
             </a:fld>
             <a:endParaRPr lang="en-US">
               <a:solidFill>
@@ -1468,7 +1470,7 @@
                 </a:solidFill>
               </a:rPr>
               <a:pPr/>
-              <a:t>9/29/2014</a:t>
+              <a:t>9/30/2014</a:t>
             </a:fld>
             <a:endParaRPr lang="en-US" dirty="0">
               <a:solidFill>
@@ -1624,7 +1626,7 @@
                 </a:solidFill>
               </a:rPr>
               <a:pPr/>
-              <a:t>9/29/2014</a:t>
+              <a:t>9/30/2014</a:t>
             </a:fld>
             <a:endParaRPr lang="en-US">
               <a:solidFill>
@@ -1832,11 +1834,32 @@
           <a:p>
             <a:r>
               <a:rPr lang="en-US" dirty="0" smtClean="0"/>
-              <a:t>The Windows App Certification</a:t>
+              <a:t>https://dev.windows.com/en-us/develop/Building-universal-Windows-apps</a:t>
+            </a:r>
+          </a:p>
+          <a:p>
+            <a:endParaRPr lang="en-US" dirty="0" smtClean="0"/>
+          </a:p>
+          <a:p>
+            <a:r>
+              <a:rPr lang="en-US" dirty="0" smtClean="0"/>
+              <a:t>The </a:t>
+            </a:r>
+            <a:r>
+              <a:rPr lang="en-US" dirty="0" smtClean="0"/>
+              <a:t>Windows App Certification</a:t>
             </a:r>
             <a:r>
               <a:rPr lang="en-US" baseline="0" dirty="0" smtClean="0"/>
-              <a:t> Kit has been extended to Phone apps. This allow a universal app to be in both Stores</a:t>
+              <a:t> Kit has been extended to Phone apps. This </a:t>
+            </a:r>
+            <a:r>
+              <a:rPr lang="en-US" baseline="0" dirty="0" smtClean="0"/>
+              <a:t>allows </a:t>
+            </a:r>
+            <a:r>
+              <a:rPr lang="en-US" baseline="0" dirty="0" smtClean="0"/>
+              <a:t>a universal app to be in both Stores</a:t>
             </a:r>
             <a:endParaRPr lang="en-US" dirty="0"/>
           </a:p>
@@ -1859,7 +1882,7 @@
           <a:p>
             <a:fld id="{831D7532-73E3-4C55-9F73-B019210AAFE6}" type="datetime1">
               <a:rPr lang="en-US" smtClean="0"/>
-              <a:t>9/29/2014</a:t>
+              <a:t>9/30/2014</a:t>
             </a:fld>
             <a:endParaRPr lang="en-US"/>
           </a:p>
@@ -2046,24 +2069,66 @@
           <a:p>
             <a:r>
               <a:rPr lang="en-US" dirty="0" smtClean="0"/>
-              <a:t>OneNote Clipper: https://www.onenote.com/Clipper/OneNote</a:t>
-            </a:r>
-          </a:p>
-          <a:p>
-            <a:endParaRPr lang="en-US" dirty="0" smtClean="0"/>
-          </a:p>
-          <a:p>
-            <a:r>
-              <a:rPr lang="en-US" dirty="0" smtClean="0"/>
-              <a:t>Demos\</a:t>
-            </a:r>
-            <a:r>
-              <a:rPr lang="en-US" dirty="0" err="1" smtClean="0"/>
-              <a:t>OneNoteSaveDialog</a:t>
+              <a:t>Create</a:t>
             </a:r>
             <a:r>
               <a:rPr lang="en-US" baseline="0" dirty="0" smtClean="0"/>
-              <a:t> folder: The html page contains two links for the Save Dialog. The first will capture a page from MSDN. The second uses jQuery to dynamically set the page to capture to be the current page. Running the page from http://localhost will cause the capture to omit the picture of the page. This is because the OneNote service cannot access localhost. This is an important distinction that will be discussed later in the module.</a:t>
+              <a:t> a new </a:t>
+            </a:r>
+            <a:r>
+              <a:rPr lang="en-US" baseline="0" dirty="0" err="1" smtClean="0"/>
+              <a:t>HubApp</a:t>
+            </a:r>
+            <a:r>
+              <a:rPr lang="en-US" baseline="0" dirty="0" smtClean="0"/>
+              <a:t> project. Show the sample data and </a:t>
+            </a:r>
+            <a:r>
+              <a:rPr lang="en-US" baseline="0" dirty="0" err="1" smtClean="0"/>
+              <a:t>datasource</a:t>
+            </a:r>
+            <a:endParaRPr lang="en-US" baseline="0" dirty="0" smtClean="0"/>
+          </a:p>
+          <a:p>
+            <a:endParaRPr lang="en-US" baseline="0" dirty="0" smtClean="0"/>
+          </a:p>
+          <a:p>
+            <a:r>
+              <a:rPr lang="en-US" baseline="0" dirty="0" smtClean="0"/>
+              <a:t>Right-click on windows app, set as startup project. Then open code-behind of </a:t>
+            </a:r>
+            <a:r>
+              <a:rPr lang="en-US" baseline="0" dirty="0" err="1" smtClean="0"/>
+              <a:t>HubPage</a:t>
+            </a:r>
+            <a:r>
+              <a:rPr lang="en-US" baseline="0" dirty="0" smtClean="0"/>
+              <a:t> and show the </a:t>
+            </a:r>
+            <a:r>
+              <a:rPr lang="en-US" baseline="0" dirty="0" err="1" smtClean="0"/>
+              <a:t>NavigationHelper_LoadState</a:t>
+            </a:r>
+            <a:r>
+              <a:rPr lang="en-US" baseline="0" dirty="0" smtClean="0"/>
+              <a:t> method. Point out the call to the sample data source. Run the project (F5)</a:t>
+            </a:r>
+          </a:p>
+          <a:p>
+            <a:endParaRPr lang="en-US" baseline="0" dirty="0" smtClean="0"/>
+          </a:p>
+          <a:p>
+            <a:r>
+              <a:rPr lang="en-US" baseline="0" dirty="0" smtClean="0"/>
+              <a:t>Right-click on phone app, set as startup project. Again, show code behind of </a:t>
+            </a:r>
+            <a:r>
+              <a:rPr lang="en-US" baseline="0" dirty="0" err="1" smtClean="0"/>
+              <a:t>HubPage</a:t>
+            </a:r>
+            <a:r>
+              <a:rPr lang="en-US" baseline="0" dirty="0" smtClean="0"/>
+              <a:t>, pointing out the similarities. The same method loads the same sample data. Run the project (F5)</a:t>
             </a:r>
             <a:endParaRPr lang="en-US" dirty="0"/>
           </a:p>
@@ -2091,7 +2156,7 @@
                 </a:solidFill>
               </a:rPr>
               <a:pPr/>
-              <a:t>9/29/2014</a:t>
+              <a:t>9/30/2014</a:t>
             </a:fld>
             <a:endParaRPr lang="en-US">
               <a:solidFill>
@@ -2429,7 +2494,7 @@
           <a:p>
             <a:fld id="{0BB6559B-C68D-49B4-97AE-9BB74C417927}" type="datetime1">
               <a:rPr lang="en-US" smtClean="0"/>
-              <a:t>9/29/2014</a:t>
+              <a:t>9/30/2014</a:t>
             </a:fld>
             <a:endParaRPr lang="en-US"/>
           </a:p>
@@ -2452,7 +2517,7 @@
           <a:p>
             <a:fld id="{B4008EB6-D09E-4580-8CD6-DDB14511944F}" type="slidenum">
               <a:rPr lang="en-US" smtClean="0"/>
-              <a:t>12</a:t>
+              <a:t>14</a:t>
             </a:fld>
             <a:endParaRPr lang="en-US" dirty="0"/>
           </a:p>
@@ -6403,12 +6468,12 @@
   <p:extLst mod="1">
     <p:ext uri="{DCECCB84-F9BA-43D5-87BE-67443E8EF086}">
       <p15:sldGuideLst xmlns:p15="http://schemas.microsoft.com/office/powerpoint/2012/main">
-        <p15:guide id="4294967295" orient="horz" pos="2203">
+        <p15:guide id="1" orient="horz" pos="2203">
           <p15:clr>
             <a:srgbClr val="FBAE40"/>
           </p15:clr>
         </p15:guide>
-        <p15:guide id="4294967295" pos="3053">
+        <p15:guide id="2" pos="3053">
           <p15:clr>
             <a:srgbClr val="FBAE40"/>
           </p15:clr>
@@ -11521,27 +11586,7 @@
           <a:p>
             <a:r>
               <a:rPr lang="en-US" dirty="0" smtClean="0"/>
-              <a:t>Deep Dive into </a:t>
-            </a:r>
-            <a:r>
-              <a:rPr lang="en-US" dirty="0" smtClean="0"/>
-              <a:t>native Universal App </a:t>
-            </a:r>
-            <a:r>
-              <a:rPr lang="en-US" smtClean="0"/>
-              <a:t>development with the </a:t>
-            </a:r>
-            <a:r>
-              <a:rPr lang="en-US" dirty="0" smtClean="0"/>
-              <a:t>Office </a:t>
-            </a:r>
-            <a:r>
-              <a:rPr lang="en-US" smtClean="0"/>
-              <a:t>365 </a:t>
-            </a:r>
-            <a:r>
-              <a:rPr lang="en-US" smtClean="0"/>
-              <a:t>APIs</a:t>
+              <a:t>Deep Dive into native Universal App development with the Office 365 APIs</a:t>
             </a:r>
             <a:endParaRPr lang="en-US" dirty="0"/>
           </a:p>
@@ -11600,13 +11645,13 @@
   <p:clrMapOvr>
     <a:masterClrMapping/>
   </p:clrMapOvr>
-  <mc:AlternateContent xmlns:mc="http://schemas.openxmlformats.org/markup-compatibility/2006">
-    <mc:Choice xmlns:p14="http://schemas.microsoft.com/office/powerpoint/2010/main" Requires="p14">
+  <mc:AlternateContent xmlns:mc="http://schemas.openxmlformats.org/markup-compatibility/2006" xmlns:p14="http://schemas.microsoft.com/office/powerpoint/2010/main">
+    <mc:Choice Requires="p14">
       <p:transition spd="slow" p14:dur="3400">
         <p14:reveal/>
       </p:transition>
     </mc:Choice>
-    <mc:Fallback>
+    <mc:Fallback xmlns="">
       <p:transition spd="slow">
         <p:fade/>
       </p:transition>
@@ -11681,6 +11726,59 @@
               <a:pPr/>
               <a:t>10</a:t>
             </a:fld>
+            <a:endParaRPr lang="en-US" dirty="0"/>
+          </a:p>
+        </p:txBody>
+      </p:sp>
+      <p:sp>
+        <p:nvSpPr>
+          <p:cNvPr id="5" name="Text Placeholder 4"/>
+          <p:cNvSpPr>
+            <a:spLocks noGrp="1"/>
+          </p:cNvSpPr>
+          <p:nvPr>
+            <p:ph type="body" sz="quarter" idx="10"/>
+          </p:nvPr>
+        </p:nvSpPr>
+        <p:spPr/>
+        <p:txBody>
+          <a:bodyPr/>
+          <a:lstStyle/>
+          <a:p>
+            <a:r>
+              <a:rPr lang="en-US" dirty="0" smtClean="0"/>
+              <a:t>C</a:t>
+            </a:r>
+            <a:r>
+              <a:rPr lang="en-US" baseline="0" dirty="0" smtClean="0"/>
+              <a:t>ontains sample data in Shared project</a:t>
+            </a:r>
+          </a:p>
+          <a:p>
+            <a:pPr lvl="1"/>
+            <a:r>
+              <a:rPr lang="en-US" dirty="0" err="1" smtClean="0"/>
+              <a:t>SampleData.json</a:t>
+            </a:r>
+            <a:endParaRPr lang="en-US" dirty="0" smtClean="0"/>
+          </a:p>
+          <a:p>
+            <a:pPr lvl="0"/>
+            <a:r>
+              <a:rPr lang="en-US" dirty="0" smtClean="0"/>
+              <a:t>Phone app</a:t>
+            </a:r>
+            <a:r>
+              <a:rPr lang="en-US" baseline="0" dirty="0" smtClean="0"/>
+              <a:t> is completely data-bound</a:t>
+            </a:r>
+          </a:p>
+          <a:p>
+            <a:pPr lvl="0"/>
+            <a:r>
+              <a:rPr lang="en-US" baseline="0" dirty="0" smtClean="0"/>
+              <a:t>Windows app only binds “Section 3”</a:t>
+            </a:r>
             <a:endParaRPr lang="en-US" dirty="0"/>
           </a:p>
         </p:txBody>
@@ -11758,7 +11856,11 @@
           <a:p>
             <a:r>
               <a:rPr lang="en-US" dirty="0" smtClean="0"/>
-              <a:t>One-Click Capture to OneNote</a:t>
+              <a:t>Universal</a:t>
+            </a:r>
+            <a:r>
+              <a:rPr lang="en-US" baseline="0" dirty="0" smtClean="0"/>
+              <a:t> App template</a:t>
             </a:r>
             <a:endParaRPr lang="en-US" dirty="0"/>
           </a:p>
@@ -11768,6 +11870,97 @@
     <p:extLst>
       <p:ext uri="{BB962C8B-B14F-4D97-AF65-F5344CB8AC3E}">
         <p14:creationId xmlns:p14="http://schemas.microsoft.com/office/powerpoint/2010/main" val="3222560637"/>
+      </p:ext>
+    </p:extLst>
+  </p:cSld>
+  <p:clrMapOvr>
+    <a:masterClrMapping/>
+  </p:clrMapOvr>
+  <mc:AlternateContent xmlns:mc="http://schemas.openxmlformats.org/markup-compatibility/2006" xmlns:p14="http://schemas.microsoft.com/office/powerpoint/2010/main">
+    <mc:Choice Requires="p14">
+      <p:transition spd="slow" p14:dur="3400">
+        <p14:reveal/>
+      </p:transition>
+    </mc:Choice>
+    <mc:Fallback xmlns="">
+      <p:transition spd="slow">
+        <p:fade/>
+      </p:transition>
+    </mc:Fallback>
+  </mc:AlternateContent>
+  <p:timing>
+    <p:tnLst>
+      <p:par>
+        <p:cTn id="1" dur="indefinite" restart="never" nodeType="tmRoot"/>
+      </p:par>
+    </p:tnLst>
+  </p:timing>
+</p:sld>
+</file>
+
+<file path=ppt/slides/slide12.xml><?xml version="1.0" encoding="utf-8"?>
+<p:sld xmlns:a="http://schemas.openxmlformats.org/drawingml/2006/main" xmlns:r="http://schemas.openxmlformats.org/officeDocument/2006/relationships" xmlns:p="http://schemas.openxmlformats.org/presentationml/2006/main">
+  <p:cSld>
+    <p:spTree>
+      <p:nvGrpSpPr>
+        <p:cNvPr id="1" name=""/>
+        <p:cNvGrpSpPr/>
+        <p:nvPr/>
+      </p:nvGrpSpPr>
+      <p:grpSpPr>
+        <a:xfrm>
+          <a:off x="0" y="0"/>
+          <a:ext cx="0" cy="0"/>
+          <a:chOff x="0" y="0"/>
+          <a:chExt cx="0" cy="0"/>
+        </a:xfrm>
+      </p:grpSpPr>
+      <p:sp>
+        <p:nvSpPr>
+          <p:cNvPr id="2" name="Title 1"/>
+          <p:cNvSpPr>
+            <a:spLocks noGrp="1"/>
+          </p:cNvSpPr>
+          <p:nvPr>
+            <p:ph type="title"/>
+          </p:nvPr>
+        </p:nvSpPr>
+        <p:spPr/>
+        <p:txBody>
+          <a:bodyPr/>
+          <a:lstStyle/>
+          <a:p>
+            <a:r>
+              <a:rPr lang="en-US" dirty="0" smtClean="0"/>
+              <a:t>Integrating Office 365</a:t>
+            </a:r>
+            <a:endParaRPr lang="en-US" dirty="0"/>
+          </a:p>
+        </p:txBody>
+      </p:sp>
+      <p:sp>
+        <p:nvSpPr>
+          <p:cNvPr id="3" name="Text Placeholder 2"/>
+          <p:cNvSpPr>
+            <a:spLocks noGrp="1"/>
+          </p:cNvSpPr>
+          <p:nvPr>
+            <p:ph type="body" sz="quarter" idx="12"/>
+          </p:nvPr>
+        </p:nvSpPr>
+        <p:spPr/>
+        <p:txBody>
+          <a:bodyPr/>
+          <a:lstStyle/>
+          <a:p>
+            <a:endParaRPr lang="en-US"/>
+          </a:p>
+        </p:txBody>
+      </p:sp>
+    </p:spTree>
+    <p:extLst>
+      <p:ext uri="{BB962C8B-B14F-4D97-AF65-F5344CB8AC3E}">
+        <p14:creationId xmlns:p14="http://schemas.microsoft.com/office/powerpoint/2010/main" val="967796703"/>
       </p:ext>
     </p:extLst>
   </p:cSld>
@@ -11786,17 +11979,152 @@
       </p:transition>
     </mc:Fallback>
   </mc:AlternateContent>
-  <p:timing>
-    <p:tnLst>
-      <p:par>
-        <p:cTn id="1" dur="indefinite" restart="never" nodeType="tmRoot"/>
-      </p:par>
-    </p:tnLst>
-  </p:timing>
 </p:sld>
 </file>
 
-<file path=ppt/slides/slide12.xml><?xml version="1.0" encoding="utf-8"?>
+<file path=ppt/slides/slide13.xml><?xml version="1.0" encoding="utf-8"?>
+<p:sld xmlns:a="http://schemas.openxmlformats.org/drawingml/2006/main" xmlns:r="http://schemas.openxmlformats.org/officeDocument/2006/relationships" xmlns:p="http://schemas.openxmlformats.org/presentationml/2006/main">
+  <p:cSld>
+    <p:spTree>
+      <p:nvGrpSpPr>
+        <p:cNvPr id="1" name=""/>
+        <p:cNvGrpSpPr/>
+        <p:nvPr/>
+      </p:nvGrpSpPr>
+      <p:grpSpPr>
+        <a:xfrm>
+          <a:off x="0" y="0"/>
+          <a:ext cx="0" cy="0"/>
+          <a:chOff x="0" y="0"/>
+          <a:chExt cx="0" cy="0"/>
+        </a:xfrm>
+      </p:grpSpPr>
+      <p:sp>
+        <p:nvSpPr>
+          <p:cNvPr id="8" name="Text Placeholder 7"/>
+          <p:cNvSpPr>
+            <a:spLocks noGrp="1"/>
+          </p:cNvSpPr>
+          <p:nvPr>
+            <p:ph type="body" sz="quarter" idx="10"/>
+          </p:nvPr>
+        </p:nvSpPr>
+        <p:spPr/>
+        <p:txBody>
+          <a:bodyPr/>
+          <a:lstStyle/>
+          <a:p>
+            <a:pPr lvl="0"/>
+            <a:r>
+              <a:rPr lang="en-US" dirty="0" smtClean="0"/>
+              <a:t>Add Connected Service</a:t>
+            </a:r>
+          </a:p>
+          <a:p>
+            <a:pPr lvl="1"/>
+            <a:r>
+              <a:rPr lang="en-US" dirty="0" smtClean="0"/>
+              <a:t>Need to add</a:t>
+            </a:r>
+            <a:r>
+              <a:rPr lang="en-US" baseline="0" dirty="0" smtClean="0"/>
+              <a:t> to both Windows and Phone projects</a:t>
+            </a:r>
+          </a:p>
+          <a:p>
+            <a:pPr lvl="2"/>
+            <a:r>
+              <a:rPr lang="en-US" dirty="0" smtClean="0"/>
+              <a:t>As of September</a:t>
+            </a:r>
+            <a:r>
+              <a:rPr lang="en-US" baseline="0" dirty="0" smtClean="0"/>
+              <a:t> 2014, Office 365 libraries not compatible for Phone projects</a:t>
+            </a:r>
+          </a:p>
+          <a:p>
+            <a:pPr lvl="0"/>
+            <a:r>
+              <a:rPr lang="en-US" dirty="0" smtClean="0"/>
+              <a:t>Create a data source</a:t>
+            </a:r>
+          </a:p>
+          <a:p>
+            <a:pPr lvl="1"/>
+            <a:r>
+              <a:rPr lang="en-US" dirty="0" smtClean="0"/>
+              <a:t>XAML makes heavy use of data binding, embrace that paradigm</a:t>
+            </a:r>
+          </a:p>
+          <a:p>
+            <a:pPr lvl="0"/>
+            <a:r>
+              <a:rPr lang="en-US" dirty="0" err="1" smtClean="0"/>
+              <a:t>Stateful</a:t>
+            </a:r>
+            <a:r>
+              <a:rPr lang="en-US" dirty="0" smtClean="0"/>
+              <a:t> client</a:t>
+            </a:r>
+          </a:p>
+          <a:p>
+            <a:pPr lvl="1"/>
+            <a:r>
+              <a:rPr lang="en-US" dirty="0" smtClean="0"/>
+              <a:t>Initiate</a:t>
+            </a:r>
+            <a:r>
+              <a:rPr lang="en-US" baseline="0" dirty="0" smtClean="0"/>
+              <a:t> login/consent and store Discovery Context</a:t>
+            </a:r>
+            <a:endParaRPr lang="en-US" dirty="0"/>
+          </a:p>
+        </p:txBody>
+      </p:sp>
+      <p:sp>
+        <p:nvSpPr>
+          <p:cNvPr id="7" name="Title 6"/>
+          <p:cNvSpPr>
+            <a:spLocks noGrp="1"/>
+          </p:cNvSpPr>
+          <p:nvPr>
+            <p:ph type="title"/>
+          </p:nvPr>
+        </p:nvSpPr>
+        <p:spPr/>
+        <p:txBody>
+          <a:bodyPr/>
+          <a:lstStyle/>
+          <a:p>
+            <a:r>
+              <a:rPr lang="en-US" dirty="0" smtClean="0"/>
+              <a:t>Add</a:t>
+            </a:r>
+            <a:r>
+              <a:rPr lang="en-US" baseline="0" dirty="0" smtClean="0"/>
+              <a:t> Office 365 to Universal App</a:t>
+            </a:r>
+            <a:endParaRPr lang="en-US" dirty="0"/>
+          </a:p>
+        </p:txBody>
+      </p:sp>
+    </p:spTree>
+    <p:extLst>
+      <p:ext uri="{BB962C8B-B14F-4D97-AF65-F5344CB8AC3E}">
+        <p14:creationId xmlns:p14="http://schemas.microsoft.com/office/powerpoint/2010/main" val="175696755"/>
+      </p:ext>
+    </p:extLst>
+  </p:cSld>
+  <p:clrMapOvr>
+    <a:masterClrMapping/>
+  </p:clrMapOvr>
+  <p:transition>
+    <p:fade/>
+  </p:transition>
+</p:sld>
+</file>
+
+<file path=ppt/slides/slide14.xml><?xml version="1.0" encoding="utf-8"?>
 <p:sld xmlns:a="http://schemas.openxmlformats.org/drawingml/2006/main" xmlns:r="http://schemas.openxmlformats.org/officeDocument/2006/relationships" xmlns:p="http://schemas.openxmlformats.org/presentationml/2006/main">
   <p:cSld>
     <p:spTree>
@@ -12225,23 +12553,12 @@
           </a:p>
           <a:p>
             <a:r>
-              <a:rPr lang="en-US" dirty="0" smtClean="0"/>
-              <a:t>Overview of Universal Apps</a:t>
-            </a:r>
-            <a:endParaRPr lang="en-US" dirty="0" smtClean="0"/>
-          </a:p>
-          <a:p>
-            <a:r>
-              <a:rPr lang="en-US" dirty="0" smtClean="0"/>
-              <a:t>Deep </a:t>
-            </a:r>
-            <a:r>
-              <a:rPr lang="en-US" dirty="0" smtClean="0"/>
-              <a:t>Dive into </a:t>
-            </a:r>
-            <a:r>
               <a:rPr lang="en-US" baseline="0" dirty="0" smtClean="0"/>
-              <a:t>Universal App projects</a:t>
+              <a:t>Universal </a:t>
+            </a:r>
+            <a:r>
+              <a:rPr lang="en-US" baseline="0" dirty="0" smtClean="0"/>
+              <a:t>App projects</a:t>
             </a:r>
           </a:p>
           <a:p>
@@ -12319,13 +12636,13 @@
   <p:clrMapOvr>
     <a:masterClrMapping/>
   </p:clrMapOvr>
-  <mc:AlternateContent xmlns:mc="http://schemas.openxmlformats.org/markup-compatibility/2006">
-    <mc:Choice xmlns:p14="http://schemas.microsoft.com/office/powerpoint/2010/main" Requires="p14">
+  <mc:AlternateContent xmlns:mc="http://schemas.openxmlformats.org/markup-compatibility/2006" xmlns:p14="http://schemas.microsoft.com/office/powerpoint/2010/main">
+    <mc:Choice Requires="p14">
       <p:transition spd="med" p14:dur="700">
         <p:fade/>
       </p:transition>
     </mc:Choice>
-    <mc:Fallback>
+    <mc:Fallback xmlns="">
       <p:transition spd="med">
         <p:fade/>
       </p:transition>
@@ -12410,13 +12727,13 @@
   <p:clrMapOvr>
     <a:masterClrMapping/>
   </p:clrMapOvr>
-  <mc:AlternateContent xmlns:mc="http://schemas.openxmlformats.org/markup-compatibility/2006">
-    <mc:Choice xmlns:p14="http://schemas.microsoft.com/office/powerpoint/2010/main" Requires="p14">
+  <mc:AlternateContent xmlns:mc="http://schemas.openxmlformats.org/markup-compatibility/2006" xmlns:p14="http://schemas.microsoft.com/office/powerpoint/2010/main">
+    <mc:Choice Requires="p14">
       <p:transition spd="slow" p14:dur="3400">
         <p14:reveal/>
       </p:transition>
     </mc:Choice>
-    <mc:Fallback>
+    <mc:Fallback xmlns="">
       <p:transition spd="slow">
         <p:fade/>
       </p:transition>
@@ -12604,7 +12921,11 @@
           <a:p>
             <a:r>
               <a:rPr lang="en-US" dirty="0" smtClean="0"/>
-              <a:t>Overview of Universal Apps</a:t>
+              <a:t>Universal App</a:t>
+            </a:r>
+            <a:r>
+              <a:rPr lang="en-US" baseline="0" dirty="0" smtClean="0"/>
+              <a:t> Project</a:t>
             </a:r>
             <a:endParaRPr lang="en-US" dirty="0"/>
           </a:p>
@@ -12671,13 +12992,13 @@
   <p:clrMapOvr>
     <a:masterClrMapping/>
   </p:clrMapOvr>
-  <mc:AlternateContent xmlns:mc="http://schemas.openxmlformats.org/markup-compatibility/2006">
-    <mc:Choice xmlns:p14="http://schemas.microsoft.com/office/powerpoint/2010/main" Requires="p14">
+  <mc:AlternateContent xmlns:mc="http://schemas.openxmlformats.org/markup-compatibility/2006" xmlns:p14="http://schemas.microsoft.com/office/powerpoint/2010/main">
+    <mc:Choice Requires="p14">
       <p:transition spd="slow" p14:dur="3400">
         <p14:reveal/>
       </p:transition>
     </mc:Choice>
-    <mc:Fallback>
+    <mc:Fallback xmlns="">
       <p:transition spd="slow">
         <p:fade/>
       </p:transition>
@@ -14494,6 +14815,24 @@
 </file>
 
 <file path=customXml/item1.xml><?xml version="1.0" encoding="utf-8"?>
+<?mso-contentType ?>
+<FormTemplates xmlns="http://schemas.microsoft.com/sharepoint/v3/contenttype/forms">
+  <Display>DocumentLibraryForm</Display>
+  <Edit>DocumentLibraryForm</Edit>
+  <New>DocumentLibraryForm</New>
+</FormTemplates>
+</file>
+
+<file path=customXml/item2.xml><?xml version="1.0" encoding="utf-8"?>
+<p:properties xmlns:p="http://schemas.microsoft.com/office/2006/metadata/properties" xmlns:xsi="http://www.w3.org/2001/XMLSchema-instance" xmlns:pc="http://schemas.microsoft.com/office/infopath/2007/PartnerControls">
+  <documentManagement>
+    <Company xmlns="http://schemas.microsoft.com/sharepoint/v3">Critical Path</Company>
+    <Project xmlns="c7dd7a47-5eb0-4219-9c75-8258c822be9e" xsi:nil="true"/>
+  </documentManagement>
+</p:properties>
+</file>
+
+<file path=customXml/item3.xml><?xml version="1.0" encoding="utf-8"?>
 <ct:contentTypeSchema xmlns:ct="http://schemas.microsoft.com/office/2006/metadata/contentType" xmlns:ma="http://schemas.microsoft.com/office/2006/metadata/properties/metaAttributes" ct:_="" ma:_="" ma:contentTypeName="Document" ma:contentTypeID="0x0101006D61B4CFCB5D8D4A8E65D32A29D8DB3E" ma:contentTypeVersion="3" ma:contentTypeDescription="Create a new document." ma:contentTypeScope="" ma:versionID="f0276697cd14aa124c054602ce8fe3c5">
   <xsd:schema xmlns:xsd="http://www.w3.org/2001/XMLSchema" xmlns:xs="http://www.w3.org/2001/XMLSchema" xmlns:p="http://schemas.microsoft.com/office/2006/metadata/properties" xmlns:ns1="http://schemas.microsoft.com/sharepoint/v3" xmlns:ns2="c7dd7a47-5eb0-4219-9c75-8258c822be9e" targetNamespace="http://schemas.microsoft.com/office/2006/metadata/properties" ma:root="true" ma:fieldsID="ce85d22485e5625b9ccd59583b658dde" ns1:_="" ns2:_="">
     <xsd:import namespace="http://schemas.microsoft.com/sharepoint/v3"/>
@@ -14632,25 +14971,26 @@
 </ct:contentTypeSchema>
 </file>
 
-<file path=customXml/item2.xml><?xml version="1.0" encoding="utf-8"?>
-<p:properties xmlns:p="http://schemas.microsoft.com/office/2006/metadata/properties" xmlns:xsi="http://www.w3.org/2001/XMLSchema-instance" xmlns:pc="http://schemas.microsoft.com/office/infopath/2007/PartnerControls">
-  <documentManagement>
-    <Company xmlns="http://schemas.microsoft.com/sharepoint/v3">Critical Path</Company>
-    <Project xmlns="c7dd7a47-5eb0-4219-9c75-8258c822be9e" xsi:nil="true"/>
-  </documentManagement>
-</p:properties>
+<file path=customXml/itemProps1.xml><?xml version="1.0" encoding="utf-8"?>
+<ds:datastoreItem xmlns:ds="http://schemas.openxmlformats.org/officeDocument/2006/customXml" ds:itemID="{E1E0CE18-CA03-4891-9CD8-3448778E3D53}">
+  <ds:schemaRefs>
+    <ds:schemaRef ds:uri="http://schemas.microsoft.com/sharepoint/v3/contenttype/forms"/>
+  </ds:schemaRefs>
+</ds:datastoreItem>
 </file>
 
-<file path=customXml/item3.xml><?xml version="1.0" encoding="utf-8"?>
-<?mso-contentType ?>
-<FormTemplates xmlns="http://schemas.microsoft.com/sharepoint/v3/contenttype/forms">
-  <Display>DocumentLibraryForm</Display>
-  <Edit>DocumentLibraryForm</Edit>
-  <New>DocumentLibraryForm</New>
-</FormTemplates>
+<file path=customXml/itemProps2.xml><?xml version="1.0" encoding="utf-8"?>
+<ds:datastoreItem xmlns:ds="http://schemas.openxmlformats.org/officeDocument/2006/customXml" ds:itemID="{DA593625-DB14-4FB0-B5A9-3269FA9C120B}">
+  <ds:schemaRefs>
+    <ds:schemaRef ds:uri="http://schemas.microsoft.com/office/2006/metadata/properties"/>
+    <ds:schemaRef ds:uri="http://schemas.microsoft.com/office/infopath/2007/PartnerControls"/>
+    <ds:schemaRef ds:uri="http://schemas.microsoft.com/sharepoint/v3"/>
+    <ds:schemaRef ds:uri="c7dd7a47-5eb0-4219-9c75-8258c822be9e"/>
+  </ds:schemaRefs>
+</ds:datastoreItem>
 </file>
 
-<file path=customXml/itemProps1.xml><?xml version="1.0" encoding="utf-8"?>
+<file path=customXml/itemProps3.xml><?xml version="1.0" encoding="utf-8"?>
 <ds:datastoreItem xmlns:ds="http://schemas.openxmlformats.org/officeDocument/2006/customXml" ds:itemID="{EF3CB00D-FBE3-46CD-905F-2C1357C53E46}">
   <ds:schemaRefs>
     <ds:schemaRef ds:uri="http://schemas.microsoft.com/office/2006/metadata/contentType"/>
@@ -14667,23 +15007,4 @@
     <ds:schemaRef ds:uri="http://schemas.microsoft.com/internal/obd"/>
   </ds:schemaRefs>
 </ds:datastoreItem>
-</file>
-
-<file path=customXml/itemProps2.xml><?xml version="1.0" encoding="utf-8"?>
-<ds:datastoreItem xmlns:ds="http://schemas.openxmlformats.org/officeDocument/2006/customXml" ds:itemID="{DA593625-DB14-4FB0-B5A9-3269FA9C120B}">
-  <ds:schemaRefs>
-    <ds:schemaRef ds:uri="http://schemas.microsoft.com/office/2006/metadata/properties"/>
-    <ds:schemaRef ds:uri="http://schemas.microsoft.com/office/infopath/2007/PartnerControls"/>
-    <ds:schemaRef ds:uri="http://schemas.microsoft.com/sharepoint/v3"/>
-    <ds:schemaRef ds:uri="c7dd7a47-5eb0-4219-9c75-8258c822be9e"/>
-  </ds:schemaRefs>
-</ds:datastoreItem>
-</file>
-
-<file path=customXml/itemProps3.xml><?xml version="1.0" encoding="utf-8"?>
-<ds:datastoreItem xmlns:ds="http://schemas.openxmlformats.org/officeDocument/2006/customXml" ds:itemID="{E1E0CE18-CA03-4891-9CD8-3448778E3D53}">
-  <ds:schemaRefs>
-    <ds:schemaRef ds:uri="http://schemas.microsoft.com/sharepoint/v3/contenttype/forms"/>
-  </ds:schemaRefs>
-</ds:datastoreItem>
 </file>
</xml_diff>